<commit_message>
added Scrape_ESG.ipynb to scrape 113 companies ESG data, added Extract_stocks_time_data.ipynb to extract 113 company stocks with time data, added stocks with sector data
</commit_message>
<xml_diff>
--- a/ESG_Slides.pptx
+++ b/ESG_Slides.pptx
@@ -5,7 +5,7 @@
     <p:sldMasterId id="2147483659" r:id="rId1"/>
   </p:sldMasterIdLst>
   <p:notesMasterIdLst>
-    <p:notesMasterId r:id="rId15"/>
+    <p:notesMasterId r:id="rId16"/>
   </p:notesMasterIdLst>
   <p:sldIdLst>
     <p:sldId id="256" r:id="rId2"/>
@@ -20,38 +20,39 @@
     <p:sldId id="264" r:id="rId11"/>
     <p:sldId id="272" r:id="rId12"/>
     <p:sldId id="273" r:id="rId13"/>
-    <p:sldId id="277" r:id="rId14"/>
+    <p:sldId id="279" r:id="rId14"/>
+    <p:sldId id="277" r:id="rId15"/>
   </p:sldIdLst>
   <p:sldSz cx="9144000" cy="5143500" type="screen16x9"/>
   <p:notesSz cx="6858000" cy="9144000"/>
   <p:embeddedFontLst>
     <p:embeddedFont>
       <p:font typeface="Calibri" panose="020F0502020204030204" pitchFamily="34" charset="0"/>
-      <p:regular r:id="rId16"/>
-      <p:bold r:id="rId17"/>
-      <p:italic r:id="rId18"/>
-      <p:boldItalic r:id="rId19"/>
+      <p:regular r:id="rId17"/>
+      <p:bold r:id="rId18"/>
+      <p:italic r:id="rId19"/>
+      <p:boldItalic r:id="rId20"/>
     </p:embeddedFont>
     <p:embeddedFont>
       <p:font typeface="Lato" panose="020F0502020204030203" pitchFamily="34" charset="0"/>
-      <p:regular r:id="rId20"/>
-      <p:bold r:id="rId21"/>
-      <p:italic r:id="rId22"/>
-      <p:boldItalic r:id="rId23"/>
+      <p:regular r:id="rId21"/>
+      <p:bold r:id="rId22"/>
+      <p:italic r:id="rId23"/>
+      <p:boldItalic r:id="rId24"/>
     </p:embeddedFont>
     <p:embeddedFont>
       <p:font typeface="Nunito" pitchFamily="2" charset="0"/>
-      <p:regular r:id="rId24"/>
-      <p:bold r:id="rId25"/>
-      <p:italic r:id="rId26"/>
-      <p:boldItalic r:id="rId27"/>
+      <p:regular r:id="rId25"/>
+      <p:bold r:id="rId26"/>
+      <p:italic r:id="rId27"/>
+      <p:boldItalic r:id="rId28"/>
     </p:embeddedFont>
     <p:embeddedFont>
       <p:font typeface="open sans" panose="020B0606030504020204" pitchFamily="34" charset="0"/>
-      <p:regular r:id="rId28"/>
-      <p:bold r:id="rId29"/>
-      <p:italic r:id="rId30"/>
-      <p:boldItalic r:id="rId31"/>
+      <p:regular r:id="rId29"/>
+      <p:bold r:id="rId30"/>
+      <p:italic r:id="rId31"/>
+      <p:boldItalic r:id="rId32"/>
     </p:embeddedFont>
   </p:embeddedFontLst>
   <p:defaultTextStyle>
@@ -9206,6 +9207,137 @@
   <p:cSld>
     <p:spTree>
       <p:nvGrpSpPr>
+        <p:cNvPr id="1" name=""/>
+        <p:cNvGrpSpPr/>
+        <p:nvPr/>
+      </p:nvGrpSpPr>
+      <p:grpSpPr>
+        <a:xfrm>
+          <a:off x="0" y="0"/>
+          <a:ext cx="0" cy="0"/>
+          <a:chOff x="0" y="0"/>
+          <a:chExt cx="0" cy="0"/>
+        </a:xfrm>
+      </p:grpSpPr>
+      <p:sp>
+        <p:nvSpPr>
+          <p:cNvPr id="2" name="Title 1">
+            <a:extLst>
+              <a:ext uri="{FF2B5EF4-FFF2-40B4-BE49-F238E27FC236}">
+                <a16:creationId xmlns:a16="http://schemas.microsoft.com/office/drawing/2014/main" id="{A77CEB95-55FB-4D62-8623-8B9E887398C1}"/>
+              </a:ext>
+            </a:extLst>
+          </p:cNvPr>
+          <p:cNvSpPr>
+            <a:spLocks noGrp="1"/>
+          </p:cNvSpPr>
+          <p:nvPr>
+            <p:ph type="title"/>
+          </p:nvPr>
+        </p:nvSpPr>
+        <p:spPr/>
+        <p:txBody>
+          <a:bodyPr/>
+          <a:lstStyle/>
+          <a:p>
+            <a:r>
+              <a:rPr lang="en-IN" dirty="0"/>
+              <a:t>Roles of team members</a:t>
+            </a:r>
+          </a:p>
+        </p:txBody>
+      </p:sp>
+      <p:sp>
+        <p:nvSpPr>
+          <p:cNvPr id="3" name="Text Placeholder 2">
+            <a:extLst>
+              <a:ext uri="{FF2B5EF4-FFF2-40B4-BE49-F238E27FC236}">
+                <a16:creationId xmlns:a16="http://schemas.microsoft.com/office/drawing/2014/main" id="{0B1F1491-1066-4A8B-B44B-006181BDA333}"/>
+              </a:ext>
+            </a:extLst>
+          </p:cNvPr>
+          <p:cNvSpPr>
+            <a:spLocks noGrp="1"/>
+          </p:cNvSpPr>
+          <p:nvPr>
+            <p:ph type="body" idx="1"/>
+          </p:nvPr>
+        </p:nvSpPr>
+        <p:spPr/>
+        <p:txBody>
+          <a:bodyPr/>
+          <a:lstStyle/>
+          <a:p>
+            <a:r>
+              <a:rPr lang="en-IN" dirty="0"/>
+              <a:t>Square Role  - Monica </a:t>
+            </a:r>
+            <a:r>
+              <a:rPr lang="en-IN" dirty="0" err="1"/>
+              <a:t>Dodds</a:t>
+            </a:r>
+            <a:endParaRPr lang="en-IN" dirty="0"/>
+          </a:p>
+          <a:p>
+            <a:r>
+              <a:rPr lang="en-IN" dirty="0"/>
+              <a:t>Triangle Role - </a:t>
+            </a:r>
+            <a:r>
+              <a:rPr lang="en-IN" dirty="0" err="1"/>
+              <a:t>Yicong</a:t>
+            </a:r>
+            <a:r>
+              <a:rPr lang="en-IN" dirty="0"/>
+              <a:t> Luo</a:t>
+            </a:r>
+          </a:p>
+          <a:p>
+            <a:r>
+              <a:rPr lang="en-IN" dirty="0"/>
+              <a:t>Circle Role - Sachin </a:t>
+            </a:r>
+            <a:r>
+              <a:rPr lang="en-IN" dirty="0" err="1"/>
+              <a:t>Nabbar</a:t>
+            </a:r>
+            <a:endParaRPr lang="en-IN" dirty="0"/>
+          </a:p>
+          <a:p>
+            <a:r>
+              <a:rPr lang="en-IN" dirty="0"/>
+              <a:t>X Role – </a:t>
+            </a:r>
+            <a:r>
+              <a:rPr lang="en-IN" dirty="0" err="1"/>
+              <a:t>Sucharita</a:t>
+            </a:r>
+            <a:r>
+              <a:rPr lang="en-IN"/>
+              <a:t> Bhattacharjee</a:t>
+            </a:r>
+            <a:endParaRPr lang="en-IN" dirty="0"/>
+          </a:p>
+        </p:txBody>
+      </p:sp>
+    </p:spTree>
+    <p:extLst>
+      <p:ext uri="{BB962C8B-B14F-4D97-AF65-F5344CB8AC3E}">
+        <p14:creationId xmlns:p14="http://schemas.microsoft.com/office/powerpoint/2010/main" val="2954721221"/>
+      </p:ext>
+    </p:extLst>
+  </p:cSld>
+  <p:clrMapOvr>
+    <a:masterClrMapping/>
+  </p:clrMapOvr>
+</p:sld>
+</file>
+
+<file path=ppt/slides/slide14.xml><?xml version="1.0" encoding="utf-8"?>
+<p:sld xmlns:a="http://schemas.openxmlformats.org/drawingml/2006/main" xmlns:r="http://schemas.openxmlformats.org/officeDocument/2006/relationships" xmlns:p="http://schemas.openxmlformats.org/presentationml/2006/main">
+  <p:cSld>
+    <p:spTree>
+      <p:nvGrpSpPr>
         <p:cNvPr id="1" name="Shape 176"/>
         <p:cNvGrpSpPr/>
         <p:nvPr/>

</xml_diff>